<commit_message>
updated PPIT and ITW assignments
</commit_message>
<xml_diff>
--- a/ITW/u3149399/P4-u3149399-presentation.pptx
+++ b/ITW/u3149399/P4-u3149399-presentation.pptx
@@ -212,7 +212,7 @@
           <a:p>
             <a:fld id="{C2BC013F-E825-2F4A-A0CD-BB8B5776E292}" type="datetime1">
               <a:rPr lang="en-AU" smtClean="0"/>
-              <a:t>21/4/17</a:t>
+              <a:t>25/4/17</a:t>
             </a:fld>
             <a:endParaRPr lang="en-US"/>
           </a:p>
@@ -382,7 +382,7 @@
           <a:p>
             <a:fld id="{94DD2EF6-1681-224A-9A27-C3E139DC8C47}" type="datetime1">
               <a:rPr lang="en-AU" smtClean="0"/>
-              <a:t>21/4/17</a:t>
+              <a:t>25/4/17</a:t>
             </a:fld>
             <a:endParaRPr lang="en-US"/>
           </a:p>
@@ -772,7 +772,7 @@
           <a:p>
             <a:fld id="{28422A51-8023-DA46-8C48-E0F2F68C7F8C}" type="datetime1">
               <a:rPr lang="en-AU" smtClean="0"/>
-              <a:t>21/4/17</a:t>
+              <a:t>25/4/17</a:t>
             </a:fld>
             <a:endParaRPr lang="en-US"/>
           </a:p>
@@ -929,7 +929,7 @@
           <a:p>
             <a:fld id="{4835769D-5A45-7140-BD12-F92FCE9D0BDE}" type="datetime1">
               <a:rPr lang="en-AU" smtClean="0"/>
-              <a:t>21/4/17</a:t>
+              <a:t>25/4/17</a:t>
             </a:fld>
             <a:endParaRPr lang="en-US"/>
           </a:p>
@@ -1096,7 +1096,7 @@
           <a:p>
             <a:fld id="{7F66D113-389D-EF43-AED1-E00EB3BB1B36}" type="datetime1">
               <a:rPr lang="en-AU" smtClean="0"/>
-              <a:t>21/4/17</a:t>
+              <a:t>25/4/17</a:t>
             </a:fld>
             <a:endParaRPr lang="en-US"/>
           </a:p>
@@ -1288,7 +1288,7 @@
           <a:p>
             <a:fld id="{E006B882-10EF-8445-8F0C-EE4DA49C2A14}" type="datetime1">
               <a:rPr lang="en-AU" smtClean="0"/>
-              <a:t>21/4/17</a:t>
+              <a:t>25/4/17</a:t>
             </a:fld>
             <a:endParaRPr lang="en-US"/>
           </a:p>
@@ -1465,7 +1465,7 @@
           <a:p>
             <a:fld id="{E1B6AB2D-FC4A-8842-ACF2-0A1B1F8B6C94}" type="datetime1">
               <a:rPr lang="en-AU" smtClean="0"/>
-              <a:t>21/4/17</a:t>
+              <a:t>25/4/17</a:t>
             </a:fld>
             <a:endParaRPr lang="en-US"/>
           </a:p>
@@ -1642,7 +1642,7 @@
           <a:p>
             <a:fld id="{89A5AA35-1732-FF4F-8D16-0C2C22BDD085}" type="datetime1">
               <a:rPr lang="en-AU" smtClean="0"/>
-              <a:t>21/4/17</a:t>
+              <a:t>25/4/17</a:t>
             </a:fld>
             <a:endParaRPr lang="en-US"/>
           </a:p>
@@ -1845,7 +1845,7 @@
           <a:p>
             <a:fld id="{C6CEF07C-FD7D-7945-A764-E71E3E41BD77}" type="datetime1">
               <a:rPr lang="en-AU" smtClean="0"/>
-              <a:t>21/4/17</a:t>
+              <a:t>25/4/17</a:t>
             </a:fld>
             <a:endParaRPr lang="en-US"/>
           </a:p>
@@ -2010,7 +2010,6 @@
               <a:rPr lang="en-US" baseline="0" dirty="0" smtClean="0"/>
               <a:t>Information on need for expansion</a:t>
             </a:r>
-            <a:endParaRPr lang="en-US" baseline="0" dirty="0" smtClean="0"/>
           </a:p>
         </p:txBody>
       </p:sp>
@@ -2054,7 +2053,7 @@
           <a:p>
             <a:fld id="{5C8590D3-3AC8-AB46-9729-5A473903AF2C}" type="datetime1">
               <a:rPr lang="en-AU" smtClean="0"/>
-              <a:t>21/4/17</a:t>
+              <a:t>25/4/17</a:t>
             </a:fld>
             <a:endParaRPr lang="en-US"/>
           </a:p>
@@ -2220,7 +2219,7 @@
           <a:p>
             <a:fld id="{DB599768-779D-044C-8F53-6F8972300572}" type="datetime1">
               <a:rPr lang="en-AU" smtClean="0"/>
-              <a:t>21/4/17</a:t>
+              <a:t>25/4/17</a:t>
             </a:fld>
             <a:endParaRPr lang="en-US"/>
           </a:p>
@@ -3473,7 +3472,7 @@
           <a:p>
             <a:fld id="{F2925299-29F2-9240-9CFE-CF866BE81C9F}" type="datetime1">
               <a:rPr lang="en-AU" smtClean="0"/>
-              <a:t>21/4/17</a:t>
+              <a:t>25/4/17</a:t>
             </a:fld>
             <a:endParaRPr lang="en-US"/>
           </a:p>
@@ -3720,7 +3719,7 @@
           <a:p>
             <a:fld id="{D35DCFDA-B576-1F46-B665-8669094FB934}" type="datetime1">
               <a:rPr lang="en-AU" smtClean="0"/>
-              <a:t>21/4/17</a:t>
+              <a:t>25/4/17</a:t>
             </a:fld>
             <a:endParaRPr lang="en-US"/>
           </a:p>
@@ -3904,7 +3903,7 @@
           <a:p>
             <a:fld id="{89ED706E-1624-674C-B2AC-2E2224BE5ED0}" type="datetime1">
               <a:rPr lang="en-AU" smtClean="0"/>
-              <a:t>21/4/17</a:t>
+              <a:t>25/4/17</a:t>
             </a:fld>
             <a:endParaRPr lang="en-US"/>
           </a:p>
@@ -4083,7 +4082,7 @@
           <a:p>
             <a:fld id="{D29DE5AC-5B3E-0144-A229-C0212907CF37}" type="datetime1">
               <a:rPr lang="en-AU" smtClean="0"/>
-              <a:t>21/4/17</a:t>
+              <a:t>25/4/17</a:t>
             </a:fld>
             <a:endParaRPr lang="en-US"/>
           </a:p>
@@ -4360,7 +4359,7 @@
           <a:p>
             <a:fld id="{7AD05A09-0455-8C46-BC4A-3B31C1D29CA9}" type="datetime1">
               <a:rPr lang="en-AU" smtClean="0"/>
-              <a:t>21/4/17</a:t>
+              <a:t>25/4/17</a:t>
             </a:fld>
             <a:endParaRPr lang="en-US"/>
           </a:p>
@@ -5570,7 +5569,7 @@
           <a:p>
             <a:fld id="{ED745861-8827-8442-8A69-E0AD2CBC4BBF}" type="datetime1">
               <a:rPr lang="en-AU" smtClean="0"/>
-              <a:t>21/4/17</a:t>
+              <a:t>25/4/17</a:t>
             </a:fld>
             <a:endParaRPr lang="en-US"/>
           </a:p>
@@ -5964,7 +5963,7 @@
           <a:p>
             <a:fld id="{2E537C04-85A1-1444-B907-64D05B573BA5}" type="datetime1">
               <a:rPr lang="en-AU" smtClean="0"/>
-              <a:t>21/4/17</a:t>
+              <a:t>25/4/17</a:t>
             </a:fld>
             <a:endParaRPr lang="en-US"/>
           </a:p>
@@ -6091,7 +6090,7 @@
           <a:p>
             <a:fld id="{8A08D74E-E988-774E-9509-06BD1E5DC536}" type="datetime1">
               <a:rPr lang="en-AU" smtClean="0"/>
-              <a:t>21/4/17</a:t>
+              <a:t>25/4/17</a:t>
             </a:fld>
             <a:endParaRPr lang="en-US"/>
           </a:p>
@@ -6190,7 +6189,7 @@
           <a:p>
             <a:fld id="{42A2E782-C302-2B41-9A93-4CCD7F3B2A4D}" type="datetime1">
               <a:rPr lang="en-AU" smtClean="0"/>
-              <a:t>21/4/17</a:t>
+              <a:t>25/4/17</a:t>
             </a:fld>
             <a:endParaRPr lang="en-US"/>
           </a:p>
@@ -6962,7 +6961,7 @@
           <a:p>
             <a:fld id="{BB3EC1DE-2D18-8748-8690-4C69540DFD03}" type="datetime1">
               <a:rPr lang="en-AU" smtClean="0"/>
-              <a:t>21/4/17</a:t>
+              <a:t>25/4/17</a:t>
             </a:fld>
             <a:endParaRPr lang="en-US"/>
           </a:p>
@@ -7806,7 +7805,7 @@
           <a:p>
             <a:fld id="{F7244CBE-F215-324A-BA2E-E9C20115DEC5}" type="datetime1">
               <a:rPr lang="en-AU" smtClean="0"/>
-              <a:t>21/4/17</a:t>
+              <a:t>25/4/17</a:t>
             </a:fld>
             <a:endParaRPr lang="en-US"/>
           </a:p>
@@ -8038,7 +8037,7 @@
           <a:p>
             <a:fld id="{3752A657-D684-B948-8C98-5E8672069EA0}" type="datetime1">
               <a:rPr lang="en-AU" smtClean="0"/>
-              <a:t>21/4/17</a:t>
+              <a:t>25/4/17</a:t>
             </a:fld>
             <a:endParaRPr lang="en-US"/>
           </a:p>
@@ -9471,7 +9470,7 @@
           <a:p>
             <a:fld id="{D29DE5AC-5B3E-0144-A229-C0212907CF37}" type="datetime1">
               <a:rPr lang="en-AU" smtClean="0"/>
-              <a:t>21/4/17</a:t>
+              <a:t>25/4/17</a:t>
             </a:fld>
             <a:endParaRPr lang="en-US"/>
           </a:p>
@@ -9584,11 +9583,7 @@
           <a:p>
             <a:r>
               <a:rPr lang="en-US" dirty="0" smtClean="0"/>
-              <a:t>What we </a:t>
-            </a:r>
-            <a:r>
-              <a:rPr lang="en-US" dirty="0" smtClean="0"/>
-              <a:t>do at all seasons sewing</a:t>
+              <a:t>What we do at all seasons sewing</a:t>
             </a:r>
             <a:endParaRPr lang="en-US" dirty="0"/>
           </a:p>
@@ -9647,7 +9642,7 @@
           <a:p>
             <a:fld id="{C592A214-36CE-8043-A3C0-5D0B3631D9A3}" type="datetime1">
               <a:rPr lang="en-AU" smtClean="0"/>
-              <a:t>21/4/17</a:t>
+              <a:t>25/4/17</a:t>
             </a:fld>
             <a:endParaRPr lang="en-US" dirty="0"/>
           </a:p>
@@ -9812,7 +9807,7 @@
           <a:p>
             <a:fld id="{D29DE5AC-5B3E-0144-A229-C0212907CF37}" type="datetime1">
               <a:rPr lang="en-AU" smtClean="0"/>
-              <a:t>21/4/17</a:t>
+              <a:t>25/4/17</a:t>
             </a:fld>
             <a:endParaRPr lang="en-US"/>
           </a:p>
@@ -9947,7 +9942,7 @@
           <a:p>
             <a:fld id="{D29DE5AC-5B3E-0144-A229-C0212907CF37}" type="datetime1">
               <a:rPr lang="en-AU" smtClean="0"/>
-              <a:t>21/4/17</a:t>
+              <a:t>25/4/17</a:t>
             </a:fld>
             <a:endParaRPr lang="en-US"/>
           </a:p>
@@ -10082,7 +10077,7 @@
           <a:p>
             <a:fld id="{D29DE5AC-5B3E-0144-A229-C0212907CF37}" type="datetime1">
               <a:rPr lang="en-AU" smtClean="0"/>
-              <a:t>21/4/17</a:t>
+              <a:t>25/4/17</a:t>
             </a:fld>
             <a:endParaRPr lang="en-US"/>
           </a:p>
@@ -10217,7 +10212,7 @@
           <a:p>
             <a:fld id="{D29DE5AC-5B3E-0144-A229-C0212907CF37}" type="datetime1">
               <a:rPr lang="en-AU" smtClean="0"/>
-              <a:t>21/4/17</a:t>
+              <a:t>25/4/17</a:t>
             </a:fld>
             <a:endParaRPr lang="en-US"/>
           </a:p>
@@ -10384,7 +10379,7 @@
           <a:p>
             <a:fld id="{D29DE5AC-5B3E-0144-A229-C0212907CF37}" type="datetime1">
               <a:rPr lang="en-AU" smtClean="0"/>
-              <a:t>21/4/17</a:t>
+              <a:t>25/4/17</a:t>
             </a:fld>
             <a:endParaRPr lang="en-US"/>
           </a:p>
@@ -10696,7 +10691,7 @@
           <a:p>
             <a:fld id="{D29DE5AC-5B3E-0144-A229-C0212907CF37}" type="datetime1">
               <a:rPr lang="en-AU" smtClean="0"/>
-              <a:t>21/4/17</a:t>
+              <a:t>25/4/17</a:t>
             </a:fld>
             <a:endParaRPr lang="en-US"/>
           </a:p>
@@ -10735,13 +10730,13 @@
   <p:clrMapOvr>
     <a:masterClrMapping/>
   </p:clrMapOvr>
-  <mc:AlternateContent xmlns:mc="http://schemas.openxmlformats.org/markup-compatibility/2006">
-    <mc:Choice xmlns:p14="http://schemas.microsoft.com/office/powerpoint/2010/main" Requires="p14">
+  <mc:AlternateContent xmlns:mc="http://schemas.openxmlformats.org/markup-compatibility/2006" xmlns:p14="http://schemas.microsoft.com/office/powerpoint/2010/main">
+    <mc:Choice Requires="p14">
       <p:transition spd="slow" p14:dur="3400">
         <p14:reveal thruBlk="1"/>
       </p:transition>
     </mc:Choice>
-    <mc:Fallback>
+    <mc:Fallback xmlns="">
       <p:transition spd="slow">
         <p:fade/>
       </p:transition>

</xml_diff>

<commit_message>
updated PPIT assignment files
</commit_message>
<xml_diff>
--- a/ITW/u3149399/P4-u3149399-presentation.pptx
+++ b/ITW/u3149399/P4-u3149399-presentation.pptx
@@ -212,7 +212,7 @@
           <a:p>
             <a:fld id="{C2BC013F-E825-2F4A-A0CD-BB8B5776E292}" type="datetime1">
               <a:rPr lang="en-AU" smtClean="0"/>
-              <a:t>25/4/17</a:t>
+              <a:t>26/4/17</a:t>
             </a:fld>
             <a:endParaRPr lang="en-US"/>
           </a:p>
@@ -382,7 +382,7 @@
           <a:p>
             <a:fld id="{94DD2EF6-1681-224A-9A27-C3E139DC8C47}" type="datetime1">
               <a:rPr lang="en-AU" smtClean="0"/>
-              <a:t>25/4/17</a:t>
+              <a:t>26/4/17</a:t>
             </a:fld>
             <a:endParaRPr lang="en-US"/>
           </a:p>
@@ -701,8 +701,13 @@
             </a:r>
             <a:r>
               <a:rPr lang="en-US" baseline="0" dirty="0" smtClean="0"/>
-              <a:t> and future plans of all seasons sewing</a:t>
-            </a:r>
+              <a:t> and future plans of </a:t>
+            </a:r>
+            <a:r>
+              <a:rPr lang="en-US" baseline="0" dirty="0" smtClean="0"/>
+              <a:t>All Seasons Sewing</a:t>
+            </a:r>
+            <a:endParaRPr lang="en-US" baseline="0" dirty="0" smtClean="0"/>
           </a:p>
           <a:p>
             <a:r>
@@ -772,7 +777,7 @@
           <a:p>
             <a:fld id="{28422A51-8023-DA46-8C48-E0F2F68C7F8C}" type="datetime1">
               <a:rPr lang="en-AU" smtClean="0"/>
-              <a:t>25/4/17</a:t>
+              <a:t>26/4/17</a:t>
             </a:fld>
             <a:endParaRPr lang="en-US"/>
           </a:p>
@@ -929,7 +934,7 @@
           <a:p>
             <a:fld id="{4835769D-5A45-7140-BD12-F92FCE9D0BDE}" type="datetime1">
               <a:rPr lang="en-AU" smtClean="0"/>
-              <a:t>25/4/17</a:t>
+              <a:t>26/4/17</a:t>
             </a:fld>
             <a:endParaRPr lang="en-US"/>
           </a:p>
@@ -1096,7 +1101,7 @@
           <a:p>
             <a:fld id="{7F66D113-389D-EF43-AED1-E00EB3BB1B36}" type="datetime1">
               <a:rPr lang="en-AU" smtClean="0"/>
-              <a:t>25/4/17</a:t>
+              <a:t>26/4/17</a:t>
             </a:fld>
             <a:endParaRPr lang="en-US"/>
           </a:p>
@@ -1188,7 +1193,15 @@
             </a:r>
             <a:r>
               <a:rPr lang="en-US" baseline="0" dirty="0" smtClean="0"/>
-              <a:t> on What all season sewing does for </a:t>
+              <a:t> on What </a:t>
+            </a:r>
+            <a:r>
+              <a:rPr lang="en-US" baseline="0" dirty="0" smtClean="0"/>
+              <a:t>All Season Sewing </a:t>
+            </a:r>
+            <a:r>
+              <a:rPr lang="en-US" baseline="0" dirty="0" smtClean="0"/>
+              <a:t>does for </a:t>
             </a:r>
             <a:r>
               <a:rPr lang="en-US" baseline="0" dirty="0" err="1" smtClean="0"/>
@@ -1224,7 +1237,15 @@
             </a:pPr>
             <a:r>
               <a:rPr lang="en-US" baseline="0" dirty="0" smtClean="0"/>
-              <a:t>Business contract and status between all seasons sewing and </a:t>
+              <a:t>Business contract and status between </a:t>
+            </a:r>
+            <a:r>
+              <a:rPr lang="en-US" baseline="0" dirty="0" smtClean="0"/>
+              <a:t>All Seasons Sewing </a:t>
+            </a:r>
+            <a:r>
+              <a:rPr lang="en-US" baseline="0" dirty="0" smtClean="0"/>
+              <a:t>and </a:t>
             </a:r>
             <a:r>
               <a:rPr lang="en-US" baseline="0" dirty="0" err="1" smtClean="0"/>
@@ -1288,7 +1309,7 @@
           <a:p>
             <a:fld id="{E006B882-10EF-8445-8F0C-EE4DA49C2A14}" type="datetime1">
               <a:rPr lang="en-AU" smtClean="0"/>
-              <a:t>25/4/17</a:t>
+              <a:t>26/4/17</a:t>
             </a:fld>
             <a:endParaRPr lang="en-US"/>
           </a:p>
@@ -1380,7 +1401,15 @@
             </a:r>
             <a:r>
               <a:rPr lang="en-US" baseline="0" dirty="0" smtClean="0"/>
-              <a:t> on What all season sewing does for Handy Mittens</a:t>
+              <a:t> on What </a:t>
+            </a:r>
+            <a:r>
+              <a:rPr lang="en-US" baseline="0" dirty="0" smtClean="0"/>
+              <a:t>All Season Sewing </a:t>
+            </a:r>
+            <a:r>
+              <a:rPr lang="en-US" baseline="0" dirty="0" smtClean="0"/>
+              <a:t>does for Handy Mittens</a:t>
             </a:r>
           </a:p>
           <a:p>
@@ -1406,7 +1435,15 @@
             </a:pPr>
             <a:r>
               <a:rPr lang="en-US" baseline="0" dirty="0" smtClean="0"/>
-              <a:t>Business contract and status between all seasons sewing and Handy Mittens</a:t>
+              <a:t>Business contract and status between </a:t>
+            </a:r>
+            <a:r>
+              <a:rPr lang="en-US" baseline="0" dirty="0" smtClean="0"/>
+              <a:t>All Seasons Sewing </a:t>
+            </a:r>
+            <a:r>
+              <a:rPr lang="en-US" baseline="0" dirty="0" smtClean="0"/>
+              <a:t>and Handy Mittens</a:t>
             </a:r>
           </a:p>
           <a:p>
@@ -1465,7 +1502,7 @@
           <a:p>
             <a:fld id="{E1B6AB2D-FC4A-8842-ACF2-0A1B1F8B6C94}" type="datetime1">
               <a:rPr lang="en-AU" smtClean="0"/>
-              <a:t>25/4/17</a:t>
+              <a:t>26/4/17</a:t>
             </a:fld>
             <a:endParaRPr lang="en-US"/>
           </a:p>
@@ -1557,7 +1594,15 @@
             </a:r>
             <a:r>
               <a:rPr lang="en-US" baseline="0" dirty="0" smtClean="0"/>
-              <a:t> on What all season sewing does for Lucinda Smith</a:t>
+              <a:t> on What </a:t>
+            </a:r>
+            <a:r>
+              <a:rPr lang="en-US" baseline="0" dirty="0" smtClean="0"/>
+              <a:t>All Season Sewing </a:t>
+            </a:r>
+            <a:r>
+              <a:rPr lang="en-US" baseline="0" dirty="0" smtClean="0"/>
+              <a:t>does for Lucinda Smith</a:t>
             </a:r>
           </a:p>
           <a:p>
@@ -1583,7 +1628,15 @@
             </a:pPr>
             <a:r>
               <a:rPr lang="en-US" baseline="0" dirty="0" smtClean="0"/>
-              <a:t>Business contract and status between all seasons sewing and Lucinda Smith</a:t>
+              <a:t>Business contract and status </a:t>
+            </a:r>
+            <a:r>
+              <a:rPr lang="en-US" baseline="0" dirty="0" smtClean="0"/>
+              <a:t>between All Seasons Sewing </a:t>
+            </a:r>
+            <a:r>
+              <a:rPr lang="en-US" baseline="0" dirty="0" smtClean="0"/>
+              <a:t>and Lucinda Smith</a:t>
             </a:r>
           </a:p>
           <a:p>
@@ -1642,7 +1695,7 @@
           <a:p>
             <a:fld id="{89A5AA35-1732-FF4F-8D16-0C2C22BDD085}" type="datetime1">
               <a:rPr lang="en-AU" smtClean="0"/>
-              <a:t>25/4/17</a:t>
+              <a:t>26/4/17</a:t>
             </a:fld>
             <a:endParaRPr lang="en-US"/>
           </a:p>
@@ -1734,7 +1787,15 @@
             </a:r>
             <a:r>
               <a:rPr lang="en-US" baseline="0" dirty="0" smtClean="0"/>
-              <a:t> on What all season sewing does for Stylish Menswear</a:t>
+              <a:t> on What </a:t>
+            </a:r>
+            <a:r>
+              <a:rPr lang="en-US" baseline="0" dirty="0" smtClean="0"/>
+              <a:t>All Season Sewing </a:t>
+            </a:r>
+            <a:r>
+              <a:rPr lang="en-US" baseline="0" dirty="0" smtClean="0"/>
+              <a:t>does for Stylish Menswear</a:t>
             </a:r>
           </a:p>
           <a:p>
@@ -1786,7 +1847,15 @@
             </a:pPr>
             <a:r>
               <a:rPr lang="en-US" baseline="0" dirty="0" smtClean="0"/>
-              <a:t>Business contract and status between all seasons sewing and Stylish Menswear</a:t>
+              <a:t>Business contract and status between </a:t>
+            </a:r>
+            <a:r>
+              <a:rPr lang="en-US" baseline="0" dirty="0" smtClean="0"/>
+              <a:t>All Seasons Sewing </a:t>
+            </a:r>
+            <a:r>
+              <a:rPr lang="en-US" baseline="0" dirty="0" smtClean="0"/>
+              <a:t>and Stylish Menswear</a:t>
             </a:r>
           </a:p>
           <a:p>
@@ -1845,7 +1914,7 @@
           <a:p>
             <a:fld id="{C6CEF07C-FD7D-7945-A764-E71E3E41BD77}" type="datetime1">
               <a:rPr lang="en-AU" smtClean="0"/>
-              <a:t>25/4/17</a:t>
+              <a:t>26/4/17</a:t>
             </a:fld>
             <a:endParaRPr lang="en-US"/>
           </a:p>
@@ -1988,8 +2057,13 @@
           <a:p>
             <a:r>
               <a:rPr lang="en-US" baseline="0" dirty="0" smtClean="0"/>
-              <a:t>-  Brief on Strengths, weaknesses, opportunities and threats (SWOT) of all seasons sewing</a:t>
-            </a:r>
+              <a:t>-  Brief on Strengths, weaknesses, opportunities and threats (SWOT) of </a:t>
+            </a:r>
+            <a:r>
+              <a:rPr lang="en-US" baseline="0" dirty="0" smtClean="0"/>
+              <a:t>All Seasons Sewing</a:t>
+            </a:r>
+            <a:endParaRPr lang="en-US" baseline="0" dirty="0" smtClean="0"/>
           </a:p>
           <a:p>
             <a:pPr marL="171450" indent="-171450">
@@ -2053,7 +2127,7 @@
           <a:p>
             <a:fld id="{5C8590D3-3AC8-AB46-9729-5A473903AF2C}" type="datetime1">
               <a:rPr lang="en-AU" smtClean="0"/>
-              <a:t>25/4/17</a:t>
+              <a:t>26/4/17</a:t>
             </a:fld>
             <a:endParaRPr lang="en-US"/>
           </a:p>
@@ -2219,7 +2293,7 @@
           <a:p>
             <a:fld id="{DB599768-779D-044C-8F53-6F8972300572}" type="datetime1">
               <a:rPr lang="en-AU" smtClean="0"/>
-              <a:t>25/4/17</a:t>
+              <a:t>26/4/17</a:t>
             </a:fld>
             <a:endParaRPr lang="en-US"/>
           </a:p>
@@ -3472,7 +3546,7 @@
           <a:p>
             <a:fld id="{F2925299-29F2-9240-9CFE-CF866BE81C9F}" type="datetime1">
               <a:rPr lang="en-AU" smtClean="0"/>
-              <a:t>25/4/17</a:t>
+              <a:t>26/4/17</a:t>
             </a:fld>
             <a:endParaRPr lang="en-US"/>
           </a:p>
@@ -3719,7 +3793,7 @@
           <a:p>
             <a:fld id="{D35DCFDA-B576-1F46-B665-8669094FB934}" type="datetime1">
               <a:rPr lang="en-AU" smtClean="0"/>
-              <a:t>25/4/17</a:t>
+              <a:t>26/4/17</a:t>
             </a:fld>
             <a:endParaRPr lang="en-US"/>
           </a:p>
@@ -3903,7 +3977,7 @@
           <a:p>
             <a:fld id="{89ED706E-1624-674C-B2AC-2E2224BE5ED0}" type="datetime1">
               <a:rPr lang="en-AU" smtClean="0"/>
-              <a:t>25/4/17</a:t>
+              <a:t>26/4/17</a:t>
             </a:fld>
             <a:endParaRPr lang="en-US"/>
           </a:p>
@@ -4082,7 +4156,7 @@
           <a:p>
             <a:fld id="{D29DE5AC-5B3E-0144-A229-C0212907CF37}" type="datetime1">
               <a:rPr lang="en-AU" smtClean="0"/>
-              <a:t>25/4/17</a:t>
+              <a:t>26/4/17</a:t>
             </a:fld>
             <a:endParaRPr lang="en-US"/>
           </a:p>
@@ -4359,7 +4433,7 @@
           <a:p>
             <a:fld id="{7AD05A09-0455-8C46-BC4A-3B31C1D29CA9}" type="datetime1">
               <a:rPr lang="en-AU" smtClean="0"/>
-              <a:t>25/4/17</a:t>
+              <a:t>26/4/17</a:t>
             </a:fld>
             <a:endParaRPr lang="en-US"/>
           </a:p>
@@ -5569,7 +5643,7 @@
           <a:p>
             <a:fld id="{ED745861-8827-8442-8A69-E0AD2CBC4BBF}" type="datetime1">
               <a:rPr lang="en-AU" smtClean="0"/>
-              <a:t>25/4/17</a:t>
+              <a:t>26/4/17</a:t>
             </a:fld>
             <a:endParaRPr lang="en-US"/>
           </a:p>
@@ -5963,7 +6037,7 @@
           <a:p>
             <a:fld id="{2E537C04-85A1-1444-B907-64D05B573BA5}" type="datetime1">
               <a:rPr lang="en-AU" smtClean="0"/>
-              <a:t>25/4/17</a:t>
+              <a:t>26/4/17</a:t>
             </a:fld>
             <a:endParaRPr lang="en-US"/>
           </a:p>
@@ -6090,7 +6164,7 @@
           <a:p>
             <a:fld id="{8A08D74E-E988-774E-9509-06BD1E5DC536}" type="datetime1">
               <a:rPr lang="en-AU" smtClean="0"/>
-              <a:t>25/4/17</a:t>
+              <a:t>26/4/17</a:t>
             </a:fld>
             <a:endParaRPr lang="en-US"/>
           </a:p>
@@ -6189,7 +6263,7 @@
           <a:p>
             <a:fld id="{42A2E782-C302-2B41-9A93-4CCD7F3B2A4D}" type="datetime1">
               <a:rPr lang="en-AU" smtClean="0"/>
-              <a:t>25/4/17</a:t>
+              <a:t>26/4/17</a:t>
             </a:fld>
             <a:endParaRPr lang="en-US"/>
           </a:p>
@@ -6961,7 +7035,7 @@
           <a:p>
             <a:fld id="{BB3EC1DE-2D18-8748-8690-4C69540DFD03}" type="datetime1">
               <a:rPr lang="en-AU" smtClean="0"/>
-              <a:t>25/4/17</a:t>
+              <a:t>26/4/17</a:t>
             </a:fld>
             <a:endParaRPr lang="en-US"/>
           </a:p>
@@ -7805,7 +7879,7 @@
           <a:p>
             <a:fld id="{F7244CBE-F215-324A-BA2E-E9C20115DEC5}" type="datetime1">
               <a:rPr lang="en-AU" smtClean="0"/>
-              <a:t>25/4/17</a:t>
+              <a:t>26/4/17</a:t>
             </a:fld>
             <a:endParaRPr lang="en-US"/>
           </a:p>
@@ -8037,7 +8111,7 @@
           <a:p>
             <a:fld id="{3752A657-D684-B948-8C98-5E8672069EA0}" type="datetime1">
               <a:rPr lang="en-AU" smtClean="0"/>
-              <a:t>25/4/17</a:t>
+              <a:t>26/4/17</a:t>
             </a:fld>
             <a:endParaRPr lang="en-US"/>
           </a:p>
@@ -9470,7 +9544,7 @@
           <a:p>
             <a:fld id="{D29DE5AC-5B3E-0144-A229-C0212907CF37}" type="datetime1">
               <a:rPr lang="en-AU" smtClean="0"/>
-              <a:t>25/4/17</a:t>
+              <a:t>26/4/17</a:t>
             </a:fld>
             <a:endParaRPr lang="en-US"/>
           </a:p>
@@ -9642,7 +9716,7 @@
           <a:p>
             <a:fld id="{C592A214-36CE-8043-A3C0-5D0B3631D9A3}" type="datetime1">
               <a:rPr lang="en-AU" smtClean="0"/>
-              <a:t>25/4/17</a:t>
+              <a:t>26/4/17</a:t>
             </a:fld>
             <a:endParaRPr lang="en-US" dirty="0"/>
           </a:p>
@@ -9807,7 +9881,7 @@
           <a:p>
             <a:fld id="{D29DE5AC-5B3E-0144-A229-C0212907CF37}" type="datetime1">
               <a:rPr lang="en-AU" smtClean="0"/>
-              <a:t>25/4/17</a:t>
+              <a:t>26/4/17</a:t>
             </a:fld>
             <a:endParaRPr lang="en-US"/>
           </a:p>
@@ -9942,7 +10016,7 @@
           <a:p>
             <a:fld id="{D29DE5AC-5B3E-0144-A229-C0212907CF37}" type="datetime1">
               <a:rPr lang="en-AU" smtClean="0"/>
-              <a:t>25/4/17</a:t>
+              <a:t>26/4/17</a:t>
             </a:fld>
             <a:endParaRPr lang="en-US"/>
           </a:p>
@@ -10077,7 +10151,7 @@
           <a:p>
             <a:fld id="{D29DE5AC-5B3E-0144-A229-C0212907CF37}" type="datetime1">
               <a:rPr lang="en-AU" smtClean="0"/>
-              <a:t>25/4/17</a:t>
+              <a:t>26/4/17</a:t>
             </a:fld>
             <a:endParaRPr lang="en-US"/>
           </a:p>
@@ -10212,7 +10286,7 @@
           <a:p>
             <a:fld id="{D29DE5AC-5B3E-0144-A229-C0212907CF37}" type="datetime1">
               <a:rPr lang="en-AU" smtClean="0"/>
-              <a:t>25/4/17</a:t>
+              <a:t>26/4/17</a:t>
             </a:fld>
             <a:endParaRPr lang="en-US"/>
           </a:p>
@@ -10379,7 +10453,7 @@
           <a:p>
             <a:fld id="{D29DE5AC-5B3E-0144-A229-C0212907CF37}" type="datetime1">
               <a:rPr lang="en-AU" smtClean="0"/>
-              <a:t>25/4/17</a:t>
+              <a:t>26/4/17</a:t>
             </a:fld>
             <a:endParaRPr lang="en-US"/>
           </a:p>
@@ -10691,7 +10765,7 @@
           <a:p>
             <a:fld id="{D29DE5AC-5B3E-0144-A229-C0212907CF37}" type="datetime1">
               <a:rPr lang="en-AU" smtClean="0"/>
-              <a:t>25/4/17</a:t>
+              <a:t>26/4/17</a:t>
             </a:fld>
             <a:endParaRPr lang="en-US"/>
           </a:p>

</xml_diff>